<commit_message>
add feature part to slides
</commit_message>
<xml_diff>
--- a/slides/Presentation1.pptx
+++ b/slides/Presentation1.pptx
@@ -5,20 +5,19 @@
     <p:sldMasterId id="2147483648" r:id="rId1"/>
   </p:sldMasterIdLst>
   <p:notesMasterIdLst>
-    <p:notesMasterId r:id="rId13"/>
+    <p:notesMasterId r:id="rId12"/>
   </p:notesMasterIdLst>
   <p:sldIdLst>
     <p:sldId id="256" r:id="rId2"/>
     <p:sldId id="257" r:id="rId3"/>
     <p:sldId id="258" r:id="rId4"/>
     <p:sldId id="259" r:id="rId5"/>
-    <p:sldId id="263" r:id="rId6"/>
-    <p:sldId id="261" r:id="rId7"/>
-    <p:sldId id="262" r:id="rId8"/>
-    <p:sldId id="264" r:id="rId9"/>
-    <p:sldId id="265" r:id="rId10"/>
-    <p:sldId id="266" r:id="rId11"/>
-    <p:sldId id="260" r:id="rId12"/>
+    <p:sldId id="261" r:id="rId6"/>
+    <p:sldId id="262" r:id="rId7"/>
+    <p:sldId id="264" r:id="rId8"/>
+    <p:sldId id="265" r:id="rId9"/>
+    <p:sldId id="266" r:id="rId10"/>
+    <p:sldId id="260" r:id="rId11"/>
   </p:sldIdLst>
   <p:sldSz cx="12192000" cy="6858000"/>
   <p:notesSz cx="6858000" cy="9144000"/>
@@ -117,6 +116,11 @@
       </a:defRPr>
     </a:lvl9pPr>
   </p:defaultTextStyle>
+  <p:extLst>
+    <p:ext uri="{EFAFB233-063F-42B5-8137-9DF3F51BA10A}">
+      <p15:sldGuideLst xmlns:p15="http://schemas.microsoft.com/office/powerpoint/2012/main"/>
+    </p:ext>
+  </p:extLst>
 </p:presentation>
 </file>
 
@@ -565,7 +569,7 @@
           <a:p>
             <a:fld id="{5BC00873-E4B2-234E-885F-727CE183BB53}" type="slidenum">
               <a:rPr lang="en-US" smtClean="0"/>
-              <a:t>6</a:t>
+              <a:t>5</a:t>
             </a:fld>
             <a:endParaRPr lang="en-US"/>
           </a:p>
@@ -3669,247 +3673,6 @@
       </p:cxnSp>
       <p:sp>
         <p:nvSpPr>
-          <p:cNvPr id="9" name="TextBox 8"/>
-          <p:cNvSpPr txBox="1"/>
-          <p:nvPr/>
-        </p:nvSpPr>
-        <p:spPr>
-          <a:xfrm>
-            <a:off x="4988640" y="325727"/>
-            <a:ext cx="2233304" cy="646331"/>
-          </a:xfrm>
-          <a:prstGeom prst="rect">
-            <a:avLst/>
-          </a:prstGeom>
-          <a:noFill/>
-        </p:spPr>
-        <p:txBody>
-          <a:bodyPr wrap="none" rtlCol="0">
-            <a:spAutoFit/>
-          </a:bodyPr>
-          <a:lstStyle/>
-          <a:p>
-            <a:r>
-              <a:rPr lang="en-US" sz="3600" dirty="0" smtClean="0"/>
-              <a:t>Conclusion</a:t>
-            </a:r>
-          </a:p>
-        </p:txBody>
-      </p:sp>
-      <p:sp>
-        <p:nvSpPr>
-          <p:cNvPr id="3" name="Content Placeholder 2"/>
-          <p:cNvSpPr>
-            <a:spLocks noGrp="1"/>
-          </p:cNvSpPr>
-          <p:nvPr>
-            <p:ph sz="half" idx="1"/>
-          </p:nvPr>
-        </p:nvSpPr>
-        <p:spPr/>
-        <p:txBody>
-          <a:bodyPr/>
-          <a:lstStyle/>
-          <a:p>
-            <a:endParaRPr lang="en-US" dirty="0" smtClean="0"/>
-          </a:p>
-          <a:p>
-            <a:r>
-              <a:rPr lang="en-US" dirty="0" smtClean="0"/>
-              <a:t>XXX</a:t>
-            </a:r>
-          </a:p>
-        </p:txBody>
-      </p:sp>
-      <p:sp>
-        <p:nvSpPr>
-          <p:cNvPr id="4" name="Content Placeholder 3"/>
-          <p:cNvSpPr>
-            <a:spLocks noGrp="1"/>
-          </p:cNvSpPr>
-          <p:nvPr>
-            <p:ph sz="half" idx="2"/>
-          </p:nvPr>
-        </p:nvSpPr>
-        <p:spPr/>
-        <p:txBody>
-          <a:bodyPr/>
-          <a:lstStyle/>
-          <a:p>
-            <a:endParaRPr lang="en-US" dirty="0" smtClean="0"/>
-          </a:p>
-          <a:p>
-            <a:r>
-              <a:rPr lang="en-US" dirty="0" smtClean="0"/>
-              <a:t>YYY</a:t>
-            </a:r>
-            <a:endParaRPr lang="en-US" dirty="0"/>
-          </a:p>
-        </p:txBody>
-      </p:sp>
-      <p:sp>
-        <p:nvSpPr>
-          <p:cNvPr id="6" name="TextBox 5"/>
-          <p:cNvSpPr txBox="1"/>
-          <p:nvPr/>
-        </p:nvSpPr>
-        <p:spPr>
-          <a:xfrm>
-            <a:off x="2644811" y="1302405"/>
-            <a:ext cx="1568378" cy="523220"/>
-          </a:xfrm>
-          <a:prstGeom prst="rect">
-            <a:avLst/>
-          </a:prstGeom>
-          <a:noFill/>
-        </p:spPr>
-        <p:txBody>
-          <a:bodyPr wrap="none" rtlCol="0">
-            <a:spAutoFit/>
-          </a:bodyPr>
-          <a:lstStyle/>
-          <a:p>
-            <a:r>
-              <a:rPr lang="en-US" sz="2800" dirty="0" smtClean="0"/>
-              <a:t>Language</a:t>
-            </a:r>
-            <a:endParaRPr lang="en-US" sz="2800" dirty="0"/>
-          </a:p>
-        </p:txBody>
-      </p:sp>
-      <p:sp>
-        <p:nvSpPr>
-          <p:cNvPr id="10" name="TextBox 9"/>
-          <p:cNvSpPr txBox="1"/>
-          <p:nvPr/>
-        </p:nvSpPr>
-        <p:spPr>
-          <a:xfrm>
-            <a:off x="7978811" y="1295516"/>
-            <a:ext cx="1468415" cy="523220"/>
-          </a:xfrm>
-          <a:prstGeom prst="rect">
-            <a:avLst/>
-          </a:prstGeom>
-          <a:noFill/>
-        </p:spPr>
-        <p:txBody>
-          <a:bodyPr wrap="none" rtlCol="0">
-            <a:spAutoFit/>
-          </a:bodyPr>
-          <a:lstStyle/>
-          <a:p>
-            <a:r>
-              <a:rPr lang="en-US" sz="2800" dirty="0" smtClean="0"/>
-              <a:t>Statistics</a:t>
-            </a:r>
-            <a:endParaRPr lang="en-US" sz="2800" dirty="0"/>
-          </a:p>
-        </p:txBody>
-      </p:sp>
-    </p:spTree>
-    <p:extLst>
-      <p:ext uri="{BB962C8B-B14F-4D97-AF65-F5344CB8AC3E}">
-        <p14:creationId xmlns:p14="http://schemas.microsoft.com/office/powerpoint/2010/main" val="2113882073"/>
-      </p:ext>
-    </p:extLst>
-  </p:cSld>
-  <p:clrMapOvr>
-    <a:masterClrMapping/>
-  </p:clrMapOvr>
-  <p:timing>
-    <p:tnLst>
-      <p:par>
-        <p:cTn id="1" dur="indefinite" restart="never" nodeType="tmRoot"/>
-      </p:par>
-    </p:tnLst>
-  </p:timing>
-</p:sld>
-</file>
-
-<file path=ppt/slides/slide11.xml><?xml version="1.0" encoding="utf-8"?>
-<p:sld xmlns:a="http://schemas.openxmlformats.org/drawingml/2006/main" xmlns:r="http://schemas.openxmlformats.org/officeDocument/2006/relationships" xmlns:p="http://schemas.openxmlformats.org/presentationml/2006/main">
-  <p:cSld>
-    <p:spTree>
-      <p:nvGrpSpPr>
-        <p:cNvPr id="1" name=""/>
-        <p:cNvGrpSpPr/>
-        <p:nvPr/>
-      </p:nvGrpSpPr>
-      <p:grpSpPr>
-        <a:xfrm>
-          <a:off x="0" y="0"/>
-          <a:ext cx="0" cy="0"/>
-          <a:chOff x="0" y="0"/>
-          <a:chExt cx="0" cy="0"/>
-        </a:xfrm>
-      </p:grpSpPr>
-      <p:pic>
-        <p:nvPicPr>
-          <p:cNvPr id="5" name="image1.png"/>
-          <p:cNvPicPr>
-            <a:picLocks noChangeAspect="1"/>
-          </p:cNvPicPr>
-          <p:nvPr/>
-        </p:nvPicPr>
-        <p:blipFill>
-          <a:blip r:embed="rId2">
-            <a:extLst/>
-          </a:blip>
-          <a:stretch>
-            <a:fillRect/>
-          </a:stretch>
-        </p:blipFill>
-        <p:spPr>
-          <a:xfrm>
-            <a:off x="305304" y="249665"/>
-            <a:ext cx="2125662" cy="798457"/>
-          </a:xfrm>
-          <a:prstGeom prst="rect">
-            <a:avLst/>
-          </a:prstGeom>
-          <a:ln w="12700">
-            <a:miter lim="400000"/>
-          </a:ln>
-        </p:spPr>
-      </p:pic>
-      <p:cxnSp>
-        <p:nvCxnSpPr>
-          <p:cNvPr id="8" name="Straight Connector 7"/>
-          <p:cNvCxnSpPr/>
-          <p:nvPr/>
-        </p:nvCxnSpPr>
-        <p:spPr>
-          <a:xfrm>
-            <a:off x="457200" y="1105274"/>
-            <a:ext cx="11296185" cy="0"/>
-          </a:xfrm>
-          <a:prstGeom prst="line">
-            <a:avLst/>
-          </a:prstGeom>
-          <a:ln w="25400">
-            <a:solidFill>
-              <a:srgbClr val="C00000"/>
-            </a:solidFill>
-          </a:ln>
-        </p:spPr>
-        <p:style>
-          <a:lnRef idx="1">
-            <a:schemeClr val="accent1"/>
-          </a:lnRef>
-          <a:fillRef idx="0">
-            <a:schemeClr val="accent1"/>
-          </a:fillRef>
-          <a:effectRef idx="0">
-            <a:schemeClr val="accent1"/>
-          </a:effectRef>
-          <a:fontRef idx="minor">
-            <a:schemeClr val="tx1"/>
-          </a:fontRef>
-        </p:style>
-      </p:cxnSp>
-      <p:sp>
-        <p:nvSpPr>
           <p:cNvPr id="2" name="TextBox 1"/>
           <p:cNvSpPr txBox="1"/>
           <p:nvPr/>
@@ -4741,7 +4504,114 @@
           <a:bodyPr/>
           <a:lstStyle/>
           <a:p>
+            <a:r>
+              <a:rPr lang="en-US" dirty="0" smtClean="0"/>
+              <a:t>Type of features: 12</a:t>
+            </a:r>
+          </a:p>
+          <a:p>
+            <a:r>
+              <a:rPr lang="en-US" dirty="0" smtClean="0"/>
+              <a:t>Category of features: </a:t>
+            </a:r>
+          </a:p>
+          <a:p>
+            <a:pPr lvl="1"/>
+            <a:r>
+              <a:rPr lang="en-US" dirty="0" smtClean="0"/>
+              <a:t>Semantic</a:t>
+            </a:r>
+          </a:p>
+          <a:p>
+            <a:pPr lvl="1"/>
+            <a:r>
+              <a:rPr lang="en-US" dirty="0" smtClean="0"/>
+              <a:t>Syntactic</a:t>
+            </a:r>
             <a:endParaRPr lang="en-US" dirty="0"/>
+          </a:p>
+          <a:p>
+            <a:pPr lvl="1"/>
+            <a:r>
+              <a:rPr lang="en-US" dirty="0" smtClean="0"/>
+              <a:t>Statistical </a:t>
+            </a:r>
+            <a:endParaRPr lang="en-US" dirty="0" smtClean="0"/>
+          </a:p>
+          <a:p>
+            <a:r>
+              <a:rPr lang="en-US" dirty="0" smtClean="0"/>
+              <a:t>Most powerful features:</a:t>
+            </a:r>
+          </a:p>
+          <a:p>
+            <a:pPr lvl="1"/>
+            <a:r>
+              <a:rPr lang="en-US" dirty="0" smtClean="0"/>
+              <a:t>Perplexity ratio of quad-gram and tri-gram (Avg. cv: 85%, </a:t>
+            </a:r>
+            <a:r>
+              <a:rPr lang="en-US" dirty="0"/>
+              <a:t>D</a:t>
+            </a:r>
+            <a:r>
+              <a:rPr lang="en-US" dirty="0" smtClean="0"/>
+              <a:t>ev: 88% )</a:t>
+            </a:r>
+          </a:p>
+          <a:p>
+            <a:pPr lvl="1"/>
+            <a:r>
+              <a:rPr lang="en-US" dirty="0" smtClean="0"/>
+              <a:t>Percentage of phrases repetition (</a:t>
+            </a:r>
+            <a:r>
+              <a:rPr lang="en-US" dirty="0"/>
+              <a:t>Avg. cv: </a:t>
+            </a:r>
+            <a:r>
+              <a:rPr lang="en-US" altLang="zh-CN" dirty="0" smtClean="0"/>
+              <a:t>71</a:t>
+            </a:r>
+            <a:r>
+              <a:rPr lang="en-US" dirty="0" smtClean="0"/>
+              <a:t>%, </a:t>
+            </a:r>
+            <a:r>
+              <a:rPr lang="en-US" dirty="0"/>
+              <a:t>Dev: </a:t>
+            </a:r>
+            <a:r>
+              <a:rPr lang="en-US" dirty="0" smtClean="0"/>
+              <a:t>70% )</a:t>
+            </a:r>
+          </a:p>
+          <a:p>
+            <a:pPr lvl="1"/>
+            <a:r>
+              <a:rPr lang="en-US" dirty="0" smtClean="0"/>
+              <a:t>Number &amp; percentage of unseen pairs (</a:t>
+            </a:r>
+            <a:r>
+              <a:rPr lang="en-US" dirty="0"/>
+              <a:t>Avg. cv: </a:t>
+            </a:r>
+            <a:r>
+              <a:rPr lang="en-US" dirty="0" smtClean="0"/>
+              <a:t>62%, </a:t>
+            </a:r>
+            <a:r>
+              <a:rPr lang="en-US" dirty="0"/>
+              <a:t>Dev: </a:t>
+            </a:r>
+            <a:r>
+              <a:rPr lang="en-US" dirty="0" smtClean="0"/>
+              <a:t>63%)</a:t>
+            </a:r>
+          </a:p>
+          <a:p>
+            <a:pPr lvl="1"/>
+            <a:endParaRPr lang="en-US" dirty="0" smtClean="0"/>
           </a:p>
         </p:txBody>
       </p:sp>
@@ -4791,7 +4661,7 @@
           <p:nvPr/>
         </p:nvPicPr>
         <p:blipFill>
-          <a:blip r:embed="rId2">
+          <a:blip r:embed="rId3">
             <a:extLst/>
           </a:blip>
           <a:stretch>
@@ -4854,8 +4724,8 @@
         </p:nvSpPr>
         <p:spPr>
           <a:xfrm>
-            <a:off x="4126871" y="330636"/>
-            <a:ext cx="3938258" cy="646331"/>
+            <a:off x="4696706" y="325727"/>
+            <a:ext cx="2798587" cy="646331"/>
           </a:xfrm>
           <a:prstGeom prst="rect">
             <a:avLst/>
@@ -4869,8 +4739,8 @@
           <a:lstStyle/>
           <a:p>
             <a:r>
-              <a:rPr lang="en-US" altLang="zh-CN" sz="3600" smtClean="0"/>
-              <a:t>Feature Engineering</a:t>
+              <a:rPr lang="en-US" sz="3600" dirty="0" smtClean="0"/>
+              <a:t>Preprocessing</a:t>
             </a:r>
             <a:endParaRPr lang="en-US" sz="3600" dirty="0"/>
           </a:p>
@@ -4886,19 +4756,126 @@
             <p:ph idx="1"/>
           </p:nvPr>
         </p:nvSpPr>
-        <p:spPr/>
+        <p:spPr>
+          <a:xfrm>
+            <a:off x="838199" y="1438167"/>
+            <a:ext cx="10515600" cy="4351338"/>
+          </a:xfrm>
+        </p:spPr>
         <p:txBody>
           <a:bodyPr/>
           <a:lstStyle/>
           <a:p>
+            <a:r>
+              <a:rPr lang="en-US" dirty="0" smtClean="0"/>
+              <a:t>Handle inconsistent doc length in training and </a:t>
+            </a:r>
+            <a:r>
+              <a:rPr lang="en-US" dirty="0" err="1" smtClean="0"/>
+              <a:t>dev</a:t>
+            </a:r>
+            <a:r>
+              <a:rPr lang="en-US" dirty="0" smtClean="0"/>
+              <a:t> set</a:t>
+            </a:r>
             <a:endParaRPr lang="en-US" dirty="0"/>
           </a:p>
         </p:txBody>
       </p:sp>
+      <p:pic>
+        <p:nvPicPr>
+          <p:cNvPr id="2" name="Picture 1"/>
+          <p:cNvPicPr>
+            <a:picLocks noChangeAspect="1"/>
+          </p:cNvPicPr>
+          <p:nvPr/>
+        </p:nvPicPr>
+        <p:blipFill>
+          <a:blip r:embed="rId4">
+            <a:extLst>
+              <a:ext uri="{28A0092B-C50C-407E-A947-70E740481C1C}">
+                <a14:useLocalDpi xmlns:a14="http://schemas.microsoft.com/office/drawing/2010/main" val="0"/>
+              </a:ext>
+            </a:extLst>
+          </a:blip>
+          <a:stretch>
+            <a:fillRect/>
+          </a:stretch>
+        </p:blipFill>
+        <p:spPr>
+          <a:xfrm>
+            <a:off x="305304" y="2402238"/>
+            <a:ext cx="4034725" cy="3026044"/>
+          </a:xfrm>
+          <a:prstGeom prst="rect">
+            <a:avLst/>
+          </a:prstGeom>
+        </p:spPr>
+      </p:pic>
+      <p:pic>
+        <p:nvPicPr>
+          <p:cNvPr id="3" name="Picture 2"/>
+          <p:cNvPicPr>
+            <a:picLocks noChangeAspect="1"/>
+          </p:cNvPicPr>
+          <p:nvPr/>
+        </p:nvPicPr>
+        <p:blipFill>
+          <a:blip r:embed="rId5">
+            <a:extLst>
+              <a:ext uri="{28A0092B-C50C-407E-A947-70E740481C1C}">
+                <a14:useLocalDpi xmlns:a14="http://schemas.microsoft.com/office/drawing/2010/main" val="0"/>
+              </a:ext>
+            </a:extLst>
+          </a:blip>
+          <a:stretch>
+            <a:fillRect/>
+          </a:stretch>
+        </p:blipFill>
+        <p:spPr>
+          <a:xfrm>
+            <a:off x="3930363" y="2390614"/>
+            <a:ext cx="4070888" cy="3053166"/>
+          </a:xfrm>
+          <a:prstGeom prst="rect">
+            <a:avLst/>
+          </a:prstGeom>
+        </p:spPr>
+      </p:pic>
+      <p:pic>
+        <p:nvPicPr>
+          <p:cNvPr id="4" name="Picture 3"/>
+          <p:cNvPicPr>
+            <a:picLocks noChangeAspect="1"/>
+          </p:cNvPicPr>
+          <p:nvPr/>
+        </p:nvPicPr>
+        <p:blipFill>
+          <a:blip r:embed="rId6">
+            <a:extLst>
+              <a:ext uri="{28A0092B-C50C-407E-A947-70E740481C1C}">
+                <a14:useLocalDpi xmlns:a14="http://schemas.microsoft.com/office/drawing/2010/main" val="0"/>
+              </a:ext>
+            </a:extLst>
+          </a:blip>
+          <a:stretch>
+            <a:fillRect/>
+          </a:stretch>
+        </p:blipFill>
+        <p:spPr>
+          <a:xfrm>
+            <a:off x="7851969" y="2404175"/>
+            <a:ext cx="4070888" cy="3053166"/>
+          </a:xfrm>
+          <a:prstGeom prst="rect">
+            <a:avLst/>
+          </a:prstGeom>
+        </p:spPr>
+      </p:pic>
     </p:spTree>
     <p:extLst>
       <p:ext uri="{BB962C8B-B14F-4D97-AF65-F5344CB8AC3E}">
-        <p14:creationId xmlns:p14="http://schemas.microsoft.com/office/powerpoint/2010/main" val="1852953333"/>
+        <p14:creationId xmlns:p14="http://schemas.microsoft.com/office/powerpoint/2010/main" val="396969502"/>
       </p:ext>
     </p:extLst>
   </p:cSld>
@@ -4941,7 +4918,7 @@
           <p:nvPr/>
         </p:nvPicPr>
         <p:blipFill>
-          <a:blip r:embed="rId3">
+          <a:blip r:embed="rId2">
             <a:extLst/>
           </a:blip>
           <a:stretch>
@@ -5004,8 +4981,8 @@
         </p:nvSpPr>
         <p:spPr>
           <a:xfrm>
-            <a:off x="4696706" y="325727"/>
-            <a:ext cx="2798587" cy="646331"/>
+            <a:off x="3967981" y="325727"/>
+            <a:ext cx="4256037" cy="646331"/>
           </a:xfrm>
           <a:prstGeom prst="rect">
             <a:avLst/>
@@ -5020,142 +4997,264 @@
           <a:p>
             <a:r>
               <a:rPr lang="en-US" sz="3600" dirty="0" smtClean="0"/>
-              <a:t>Preprocessing</a:t>
+              <a:t>Choose </a:t>
+            </a:r>
+            <a:r>
+              <a:rPr lang="en-US" sz="3600" smtClean="0"/>
+              <a:t>your classifier</a:t>
             </a:r>
             <a:endParaRPr lang="en-US" sz="3600" dirty="0"/>
           </a:p>
         </p:txBody>
       </p:sp>
-      <p:sp>
-        <p:nvSpPr>
-          <p:cNvPr id="11" name="Content Placeholder 10"/>
-          <p:cNvSpPr>
-            <a:spLocks noGrp="1"/>
-          </p:cNvSpPr>
-          <p:nvPr>
-            <p:ph idx="1"/>
-          </p:nvPr>
-        </p:nvSpPr>
-        <p:spPr>
-          <a:xfrm>
-            <a:off x="838199" y="1438167"/>
-            <a:ext cx="10515600" cy="4351338"/>
-          </a:xfrm>
-        </p:spPr>
-        <p:txBody>
-          <a:bodyPr/>
-          <a:lstStyle/>
-          <a:p>
-            <a:r>
-              <a:rPr lang="en-US" dirty="0" smtClean="0"/>
-              <a:t>Handle inconsistent doc length in training and </a:t>
-            </a:r>
-            <a:r>
-              <a:rPr lang="en-US" dirty="0" err="1" smtClean="0"/>
-              <a:t>dev</a:t>
-            </a:r>
-            <a:r>
-              <a:rPr lang="en-US" dirty="0" smtClean="0"/>
-              <a:t> set</a:t>
-            </a:r>
-            <a:endParaRPr lang="en-US" dirty="0"/>
-          </a:p>
-        </p:txBody>
-      </p:sp>
-      <p:pic>
-        <p:nvPicPr>
-          <p:cNvPr id="2" name="Picture 1"/>
-          <p:cNvPicPr>
-            <a:picLocks noChangeAspect="1"/>
-          </p:cNvPicPr>
+      <p:cxnSp>
+        <p:nvCxnSpPr>
+          <p:cNvPr id="3" name="Straight Arrow Connector 2"/>
+          <p:cNvCxnSpPr/>
           <p:nvPr/>
-        </p:nvPicPr>
-        <p:blipFill>
-          <a:blip r:embed="rId4">
-            <a:extLst>
-              <a:ext uri="{28A0092B-C50C-407E-A947-70E740481C1C}">
-                <a14:useLocalDpi xmlns:a14="http://schemas.microsoft.com/office/drawing/2010/main" val="0"/>
-              </a:ext>
-            </a:extLst>
-          </a:blip>
-          <a:stretch>
-            <a:fillRect/>
-          </a:stretch>
-        </p:blipFill>
-        <p:spPr>
-          <a:xfrm>
-            <a:off x="305304" y="2402238"/>
-            <a:ext cx="4034725" cy="3026044"/>
+        </p:nvCxnSpPr>
+        <p:spPr>
+          <a:xfrm>
+            <a:off x="2430966" y="5579390"/>
+            <a:ext cx="6961007" cy="0"/>
+          </a:xfrm>
+          <a:prstGeom prst="straightConnector1">
+            <a:avLst/>
+          </a:prstGeom>
+          <a:ln w="76200">
+            <a:tailEnd type="triangle"/>
+          </a:ln>
+        </p:spPr>
+        <p:style>
+          <a:lnRef idx="1">
+            <a:schemeClr val="accent1"/>
+          </a:lnRef>
+          <a:fillRef idx="0">
+            <a:schemeClr val="accent1"/>
+          </a:fillRef>
+          <a:effectRef idx="0">
+            <a:schemeClr val="accent1"/>
+          </a:effectRef>
+          <a:fontRef idx="minor">
+            <a:schemeClr val="tx1"/>
+          </a:fontRef>
+        </p:style>
+      </p:cxnSp>
+      <p:cxnSp>
+        <p:nvCxnSpPr>
+          <p:cNvPr id="6" name="Straight Arrow Connector 5"/>
+          <p:cNvCxnSpPr/>
+          <p:nvPr/>
+        </p:nvCxnSpPr>
+        <p:spPr>
+          <a:xfrm flipV="1">
+            <a:off x="2430966" y="1844298"/>
+            <a:ext cx="0" cy="3735092"/>
+          </a:xfrm>
+          <a:prstGeom prst="straightConnector1">
+            <a:avLst/>
+          </a:prstGeom>
+          <a:ln w="76200">
+            <a:tailEnd type="triangle"/>
+          </a:ln>
+        </p:spPr>
+        <p:style>
+          <a:lnRef idx="1">
+            <a:schemeClr val="accent1"/>
+          </a:lnRef>
+          <a:fillRef idx="0">
+            <a:schemeClr val="accent1"/>
+          </a:fillRef>
+          <a:effectRef idx="0">
+            <a:schemeClr val="accent1"/>
+          </a:effectRef>
+          <a:fontRef idx="minor">
+            <a:schemeClr val="tx1"/>
+          </a:fontRef>
+        </p:style>
+      </p:cxnSp>
+      <p:sp>
+        <p:nvSpPr>
+          <p:cNvPr id="10" name="TextBox 9"/>
+          <p:cNvSpPr txBox="1"/>
+          <p:nvPr/>
+        </p:nvSpPr>
+        <p:spPr>
+          <a:xfrm>
+            <a:off x="867905" y="1844298"/>
+            <a:ext cx="1302216" cy="461665"/>
           </a:xfrm>
           <a:prstGeom prst="rect">
             <a:avLst/>
           </a:prstGeom>
-        </p:spPr>
-      </p:pic>
-      <p:pic>
-        <p:nvPicPr>
-          <p:cNvPr id="3" name="Picture 2"/>
-          <p:cNvPicPr>
-            <a:picLocks noChangeAspect="1"/>
-          </p:cNvPicPr>
+          <a:noFill/>
+        </p:spPr>
+        <p:txBody>
+          <a:bodyPr wrap="none" rtlCol="0">
+            <a:spAutoFit/>
+          </a:bodyPr>
+          <a:lstStyle/>
+          <a:p>
+            <a:r>
+              <a:rPr lang="en-US" sz="2400" dirty="0" smtClean="0"/>
+              <a:t>Accuracy</a:t>
+            </a:r>
+            <a:endParaRPr lang="en-US" sz="2400" dirty="0"/>
+          </a:p>
+        </p:txBody>
+      </p:sp>
+      <p:sp>
+        <p:nvSpPr>
+          <p:cNvPr id="12" name="TextBox 11"/>
+          <p:cNvSpPr txBox="1"/>
           <p:nvPr/>
-        </p:nvPicPr>
-        <p:blipFill>
-          <a:blip r:embed="rId5">
-            <a:extLst>
-              <a:ext uri="{28A0092B-C50C-407E-A947-70E740481C1C}">
-                <a14:useLocalDpi xmlns:a14="http://schemas.microsoft.com/office/drawing/2010/main" val="0"/>
-              </a:ext>
-            </a:extLst>
-          </a:blip>
-          <a:stretch>
-            <a:fillRect/>
-          </a:stretch>
-        </p:blipFill>
-        <p:spPr>
-          <a:xfrm>
-            <a:off x="3930363" y="2390614"/>
-            <a:ext cx="4070888" cy="3053166"/>
+        </p:nvSpPr>
+        <p:spPr>
+          <a:xfrm>
+            <a:off x="8089757" y="5824779"/>
+            <a:ext cx="1368195" cy="461665"/>
           </a:xfrm>
           <a:prstGeom prst="rect">
             <a:avLst/>
           </a:prstGeom>
-        </p:spPr>
-      </p:pic>
-      <p:pic>
-        <p:nvPicPr>
-          <p:cNvPr id="4" name="Picture 3"/>
-          <p:cNvPicPr>
-            <a:picLocks noChangeAspect="1"/>
-          </p:cNvPicPr>
+          <a:noFill/>
+        </p:spPr>
+        <p:txBody>
+          <a:bodyPr wrap="none" rtlCol="0">
+            <a:spAutoFit/>
+          </a:bodyPr>
+          <a:lstStyle/>
+          <a:p>
+            <a:r>
+              <a:rPr lang="en-US" sz="2400" dirty="0" smtClean="0"/>
+              <a:t>Efficiency</a:t>
+            </a:r>
+          </a:p>
+        </p:txBody>
+      </p:sp>
+      <p:sp>
+        <p:nvSpPr>
+          <p:cNvPr id="13" name="TextBox 12"/>
+          <p:cNvSpPr txBox="1"/>
           <p:nvPr/>
-        </p:nvPicPr>
-        <p:blipFill>
-          <a:blip r:embed="rId6">
-            <a:extLst>
-              <a:ext uri="{28A0092B-C50C-407E-A947-70E740481C1C}">
-                <a14:useLocalDpi xmlns:a14="http://schemas.microsoft.com/office/drawing/2010/main" val="0"/>
-              </a:ext>
-            </a:extLst>
-          </a:blip>
-          <a:stretch>
-            <a:fillRect/>
-          </a:stretch>
-        </p:blipFill>
-        <p:spPr>
-          <a:xfrm>
-            <a:off x="7851969" y="2404175"/>
-            <a:ext cx="4070888" cy="3053166"/>
+        </p:nvSpPr>
+        <p:spPr>
+          <a:xfrm>
+            <a:off x="3093950" y="3527178"/>
+            <a:ext cx="617670" cy="369332"/>
           </a:xfrm>
           <a:prstGeom prst="rect">
             <a:avLst/>
           </a:prstGeom>
-        </p:spPr>
-      </p:pic>
+          <a:noFill/>
+        </p:spPr>
+        <p:txBody>
+          <a:bodyPr wrap="none" rtlCol="0">
+            <a:spAutoFit/>
+          </a:bodyPr>
+          <a:lstStyle/>
+          <a:p>
+            <a:r>
+              <a:rPr lang="en-US" dirty="0" smtClean="0"/>
+              <a:t>SVM</a:t>
+            </a:r>
+            <a:endParaRPr lang="en-US" dirty="0"/>
+          </a:p>
+        </p:txBody>
+      </p:sp>
+      <p:sp>
+        <p:nvSpPr>
+          <p:cNvPr id="14" name="TextBox 13"/>
+          <p:cNvSpPr txBox="1"/>
+          <p:nvPr/>
+        </p:nvSpPr>
+        <p:spPr>
+          <a:xfrm>
+            <a:off x="6658533" y="3711844"/>
+            <a:ext cx="603050" cy="369332"/>
+          </a:xfrm>
+          <a:prstGeom prst="rect">
+            <a:avLst/>
+          </a:prstGeom>
+          <a:noFill/>
+        </p:spPr>
+        <p:txBody>
+          <a:bodyPr wrap="none" rtlCol="0">
+            <a:spAutoFit/>
+          </a:bodyPr>
+          <a:lstStyle/>
+          <a:p>
+            <a:r>
+              <a:rPr lang="en-US" dirty="0" smtClean="0"/>
+              <a:t>KNN</a:t>
+            </a:r>
+            <a:endParaRPr lang="en-US" dirty="0"/>
+          </a:p>
+        </p:txBody>
+      </p:sp>
+      <p:sp>
+        <p:nvSpPr>
+          <p:cNvPr id="15" name="TextBox 14"/>
+          <p:cNvSpPr txBox="1"/>
+          <p:nvPr/>
+        </p:nvSpPr>
+        <p:spPr>
+          <a:xfrm>
+            <a:off x="5765810" y="3793100"/>
+            <a:ext cx="407484" cy="369332"/>
+          </a:xfrm>
+          <a:prstGeom prst="rect">
+            <a:avLst/>
+          </a:prstGeom>
+          <a:noFill/>
+        </p:spPr>
+        <p:txBody>
+          <a:bodyPr wrap="none" rtlCol="0">
+            <a:spAutoFit/>
+          </a:bodyPr>
+          <a:lstStyle/>
+          <a:p>
+            <a:r>
+              <a:rPr lang="en-US" dirty="0" smtClean="0"/>
+              <a:t>LR</a:t>
+            </a:r>
+          </a:p>
+        </p:txBody>
+      </p:sp>
+      <p:sp>
+        <p:nvSpPr>
+          <p:cNvPr id="16" name="TextBox 15"/>
+          <p:cNvSpPr txBox="1"/>
+          <p:nvPr/>
+        </p:nvSpPr>
+        <p:spPr>
+          <a:xfrm>
+            <a:off x="6017428" y="2777812"/>
+            <a:ext cx="942630" cy="369332"/>
+          </a:xfrm>
+          <a:prstGeom prst="rect">
+            <a:avLst/>
+          </a:prstGeom>
+          <a:noFill/>
+        </p:spPr>
+        <p:txBody>
+          <a:bodyPr wrap="none" rtlCol="0">
+            <a:spAutoFit/>
+          </a:bodyPr>
+          <a:lstStyle/>
+          <a:p>
+            <a:r>
+              <a:rPr lang="en-US" dirty="0" err="1" smtClean="0"/>
+              <a:t>Xgboost</a:t>
+            </a:r>
+            <a:endParaRPr lang="en-US" dirty="0" smtClean="0"/>
+          </a:p>
+        </p:txBody>
+      </p:sp>
     </p:spTree>
     <p:extLst>
       <p:ext uri="{BB962C8B-B14F-4D97-AF65-F5344CB8AC3E}">
-        <p14:creationId xmlns:p14="http://schemas.microsoft.com/office/powerpoint/2010/main" val="396969502"/>
+        <p14:creationId xmlns:p14="http://schemas.microsoft.com/office/powerpoint/2010/main" val="314697543"/>
       </p:ext>
     </p:extLst>
   </p:cSld>
@@ -5509,8 +5608,8 @@
         </p:nvSpPr>
         <p:spPr>
           <a:xfrm>
-            <a:off x="6017428" y="2777812"/>
-            <a:ext cx="942630" cy="369332"/>
+            <a:off x="5728535" y="2587864"/>
+            <a:ext cx="1533048" cy="584775"/>
           </a:xfrm>
           <a:prstGeom prst="rect">
             <a:avLst/>
@@ -5524,17 +5623,25 @@
           <a:lstStyle/>
           <a:p>
             <a:r>
-              <a:rPr lang="en-US" dirty="0" err="1" smtClean="0"/>
+              <a:rPr lang="en-US" sz="3200" dirty="0" err="1" smtClean="0">
+                <a:solidFill>
+                  <a:srgbClr val="C00000"/>
+                </a:solidFill>
+              </a:rPr>
               <a:t>Xgboost</a:t>
             </a:r>
-            <a:endParaRPr lang="en-US" dirty="0" smtClean="0"/>
+            <a:endParaRPr lang="en-US" sz="3200" dirty="0" smtClean="0">
+              <a:solidFill>
+                <a:srgbClr val="C00000"/>
+              </a:solidFill>
+            </a:endParaRPr>
           </a:p>
         </p:txBody>
       </p:sp>
     </p:spTree>
     <p:extLst>
       <p:ext uri="{BB962C8B-B14F-4D97-AF65-F5344CB8AC3E}">
-        <p14:creationId xmlns:p14="http://schemas.microsoft.com/office/powerpoint/2010/main" val="314697543"/>
+        <p14:creationId xmlns:p14="http://schemas.microsoft.com/office/powerpoint/2010/main" val="144257338"/>
       </p:ext>
     </p:extLst>
   </p:cSld>
@@ -5640,8 +5747,8 @@
         </p:nvSpPr>
         <p:spPr>
           <a:xfrm>
-            <a:off x="3967981" y="325727"/>
-            <a:ext cx="4256037" cy="646331"/>
+            <a:off x="5335920" y="325727"/>
+            <a:ext cx="1520160" cy="646331"/>
           </a:xfrm>
           <a:prstGeom prst="rect">
             <a:avLst/>
@@ -5655,273 +5762,35 @@
           <a:lstStyle/>
           <a:p>
             <a:r>
-              <a:rPr lang="en-US" sz="3600" dirty="0" smtClean="0"/>
-              <a:t>Choose </a:t>
-            </a:r>
-            <a:r>
               <a:rPr lang="en-US" sz="3600" smtClean="0"/>
-              <a:t>your classifier</a:t>
-            </a:r>
-            <a:endParaRPr lang="en-US" sz="3600" dirty="0"/>
-          </a:p>
-        </p:txBody>
-      </p:sp>
-      <p:cxnSp>
-        <p:nvCxnSpPr>
-          <p:cNvPr id="3" name="Straight Arrow Connector 2"/>
-          <p:cNvCxnSpPr/>
-          <p:nvPr/>
-        </p:nvCxnSpPr>
-        <p:spPr>
-          <a:xfrm>
-            <a:off x="2430966" y="5579390"/>
-            <a:ext cx="6961007" cy="0"/>
-          </a:xfrm>
-          <a:prstGeom prst="straightConnector1">
-            <a:avLst/>
-          </a:prstGeom>
-          <a:ln w="76200">
-            <a:tailEnd type="triangle"/>
-          </a:ln>
-        </p:spPr>
-        <p:style>
-          <a:lnRef idx="1">
-            <a:schemeClr val="accent1"/>
-          </a:lnRef>
-          <a:fillRef idx="0">
-            <a:schemeClr val="accent1"/>
-          </a:fillRef>
-          <a:effectRef idx="0">
-            <a:schemeClr val="accent1"/>
-          </a:effectRef>
-          <a:fontRef idx="minor">
-            <a:schemeClr val="tx1"/>
-          </a:fontRef>
-        </p:style>
-      </p:cxnSp>
-      <p:cxnSp>
-        <p:nvCxnSpPr>
-          <p:cNvPr id="6" name="Straight Arrow Connector 5"/>
-          <p:cNvCxnSpPr/>
-          <p:nvPr/>
-        </p:nvCxnSpPr>
-        <p:spPr>
-          <a:xfrm flipV="1">
-            <a:off x="2430966" y="1844298"/>
-            <a:ext cx="0" cy="3735092"/>
-          </a:xfrm>
-          <a:prstGeom prst="straightConnector1">
-            <a:avLst/>
-          </a:prstGeom>
-          <a:ln w="76200">
-            <a:tailEnd type="triangle"/>
-          </a:ln>
-        </p:spPr>
-        <p:style>
-          <a:lnRef idx="1">
-            <a:schemeClr val="accent1"/>
-          </a:lnRef>
-          <a:fillRef idx="0">
-            <a:schemeClr val="accent1"/>
-          </a:fillRef>
-          <a:effectRef idx="0">
-            <a:schemeClr val="accent1"/>
-          </a:effectRef>
-          <a:fontRef idx="minor">
-            <a:schemeClr val="tx1"/>
-          </a:fontRef>
-        </p:style>
-      </p:cxnSp>
-      <p:sp>
-        <p:nvSpPr>
-          <p:cNvPr id="10" name="TextBox 9"/>
-          <p:cNvSpPr txBox="1"/>
-          <p:nvPr/>
-        </p:nvSpPr>
-        <p:spPr>
-          <a:xfrm>
-            <a:off x="867905" y="1844298"/>
-            <a:ext cx="1302216" cy="461665"/>
-          </a:xfrm>
-          <a:prstGeom prst="rect">
-            <a:avLst/>
-          </a:prstGeom>
-          <a:noFill/>
-        </p:spPr>
-        <p:txBody>
-          <a:bodyPr wrap="none" rtlCol="0">
-            <a:spAutoFit/>
-          </a:bodyPr>
-          <a:lstStyle/>
-          <a:p>
-            <a:r>
-              <a:rPr lang="en-US" sz="2400" dirty="0" smtClean="0"/>
-              <a:t>Accuracy</a:t>
-            </a:r>
-            <a:endParaRPr lang="en-US" sz="2400" dirty="0"/>
-          </a:p>
-        </p:txBody>
-      </p:sp>
-      <p:sp>
-        <p:nvSpPr>
-          <p:cNvPr id="12" name="TextBox 11"/>
-          <p:cNvSpPr txBox="1"/>
-          <p:nvPr/>
-        </p:nvSpPr>
-        <p:spPr>
-          <a:xfrm>
-            <a:off x="8089757" y="5824779"/>
-            <a:ext cx="1368195" cy="461665"/>
-          </a:xfrm>
-          <a:prstGeom prst="rect">
-            <a:avLst/>
-          </a:prstGeom>
-          <a:noFill/>
-        </p:spPr>
-        <p:txBody>
-          <a:bodyPr wrap="none" rtlCol="0">
-            <a:spAutoFit/>
-          </a:bodyPr>
-          <a:lstStyle/>
-          <a:p>
-            <a:r>
-              <a:rPr lang="en-US" sz="2400" dirty="0" smtClean="0"/>
-              <a:t>Efficiency</a:t>
-            </a:r>
-          </a:p>
-        </p:txBody>
-      </p:sp>
-      <p:sp>
-        <p:nvSpPr>
-          <p:cNvPr id="13" name="TextBox 12"/>
-          <p:cNvSpPr txBox="1"/>
-          <p:nvPr/>
-        </p:nvSpPr>
-        <p:spPr>
-          <a:xfrm>
-            <a:off x="3093950" y="3527178"/>
-            <a:ext cx="617670" cy="369332"/>
-          </a:xfrm>
-          <a:prstGeom prst="rect">
-            <a:avLst/>
-          </a:prstGeom>
-          <a:noFill/>
-        </p:spPr>
-        <p:txBody>
-          <a:bodyPr wrap="none" rtlCol="0">
-            <a:spAutoFit/>
-          </a:bodyPr>
-          <a:lstStyle/>
-          <a:p>
-            <a:r>
-              <a:rPr lang="en-US" dirty="0" smtClean="0"/>
-              <a:t>SVM</a:t>
-            </a:r>
+              <a:t>Results</a:t>
+            </a:r>
+          </a:p>
+        </p:txBody>
+      </p:sp>
+      <p:sp>
+        <p:nvSpPr>
+          <p:cNvPr id="11" name="Content Placeholder 10"/>
+          <p:cNvSpPr>
+            <a:spLocks noGrp="1"/>
+          </p:cNvSpPr>
+          <p:nvPr>
+            <p:ph idx="1"/>
+          </p:nvPr>
+        </p:nvSpPr>
+        <p:spPr/>
+        <p:txBody>
+          <a:bodyPr/>
+          <a:lstStyle/>
+          <a:p>
             <a:endParaRPr lang="en-US" dirty="0"/>
-          </a:p>
-        </p:txBody>
-      </p:sp>
-      <p:sp>
-        <p:nvSpPr>
-          <p:cNvPr id="14" name="TextBox 13"/>
-          <p:cNvSpPr txBox="1"/>
-          <p:nvPr/>
-        </p:nvSpPr>
-        <p:spPr>
-          <a:xfrm>
-            <a:off x="6658533" y="3711844"/>
-            <a:ext cx="603050" cy="369332"/>
-          </a:xfrm>
-          <a:prstGeom prst="rect">
-            <a:avLst/>
-          </a:prstGeom>
-          <a:noFill/>
-        </p:spPr>
-        <p:txBody>
-          <a:bodyPr wrap="none" rtlCol="0">
-            <a:spAutoFit/>
-          </a:bodyPr>
-          <a:lstStyle/>
-          <a:p>
-            <a:r>
-              <a:rPr lang="en-US" dirty="0" smtClean="0"/>
-              <a:t>KNN</a:t>
-            </a:r>
-            <a:endParaRPr lang="en-US" dirty="0"/>
-          </a:p>
-        </p:txBody>
-      </p:sp>
-      <p:sp>
-        <p:nvSpPr>
-          <p:cNvPr id="15" name="TextBox 14"/>
-          <p:cNvSpPr txBox="1"/>
-          <p:nvPr/>
-        </p:nvSpPr>
-        <p:spPr>
-          <a:xfrm>
-            <a:off x="5765810" y="3793100"/>
-            <a:ext cx="407484" cy="369332"/>
-          </a:xfrm>
-          <a:prstGeom prst="rect">
-            <a:avLst/>
-          </a:prstGeom>
-          <a:noFill/>
-        </p:spPr>
-        <p:txBody>
-          <a:bodyPr wrap="none" rtlCol="0">
-            <a:spAutoFit/>
-          </a:bodyPr>
-          <a:lstStyle/>
-          <a:p>
-            <a:r>
-              <a:rPr lang="en-US" dirty="0" smtClean="0"/>
-              <a:t>LR</a:t>
-            </a:r>
-          </a:p>
-        </p:txBody>
-      </p:sp>
-      <p:sp>
-        <p:nvSpPr>
-          <p:cNvPr id="16" name="TextBox 15"/>
-          <p:cNvSpPr txBox="1"/>
-          <p:nvPr/>
-        </p:nvSpPr>
-        <p:spPr>
-          <a:xfrm>
-            <a:off x="5728535" y="2587864"/>
-            <a:ext cx="1533048" cy="584775"/>
-          </a:xfrm>
-          <a:prstGeom prst="rect">
-            <a:avLst/>
-          </a:prstGeom>
-          <a:noFill/>
-        </p:spPr>
-        <p:txBody>
-          <a:bodyPr wrap="none" rtlCol="0">
-            <a:spAutoFit/>
-          </a:bodyPr>
-          <a:lstStyle/>
-          <a:p>
-            <a:r>
-              <a:rPr lang="en-US" sz="3200" dirty="0" err="1" smtClean="0">
-                <a:solidFill>
-                  <a:srgbClr val="C00000"/>
-                </a:solidFill>
-              </a:rPr>
-              <a:t>Xgboost</a:t>
-            </a:r>
-            <a:endParaRPr lang="en-US" sz="3200" dirty="0" smtClean="0">
-              <a:solidFill>
-                <a:srgbClr val="C00000"/>
-              </a:solidFill>
-            </a:endParaRPr>
           </a:p>
         </p:txBody>
       </p:sp>
     </p:spTree>
     <p:extLst>
       <p:ext uri="{BB962C8B-B14F-4D97-AF65-F5344CB8AC3E}">
-        <p14:creationId xmlns:p14="http://schemas.microsoft.com/office/powerpoint/2010/main" val="144257338"/>
+        <p14:creationId xmlns:p14="http://schemas.microsoft.com/office/powerpoint/2010/main" val="1572789813"/>
       </p:ext>
     </p:extLst>
   </p:cSld>
@@ -6027,8 +5896,8 @@
         </p:nvSpPr>
         <p:spPr>
           <a:xfrm>
-            <a:off x="5335920" y="325727"/>
-            <a:ext cx="1520160" cy="646331"/>
+            <a:off x="4988640" y="325727"/>
+            <a:ext cx="2233304" cy="646331"/>
           </a:xfrm>
           <a:prstGeom prst="rect">
             <a:avLst/>
@@ -6042,20 +5911,20 @@
           <a:lstStyle/>
           <a:p>
             <a:r>
-              <a:rPr lang="en-US" sz="3600" smtClean="0"/>
-              <a:t>Results</a:t>
-            </a:r>
-          </a:p>
-        </p:txBody>
-      </p:sp>
-      <p:sp>
-        <p:nvSpPr>
-          <p:cNvPr id="11" name="Content Placeholder 10"/>
-          <p:cNvSpPr>
-            <a:spLocks noGrp="1"/>
-          </p:cNvSpPr>
-          <p:nvPr>
-            <p:ph idx="1"/>
+              <a:rPr lang="en-US" sz="3600" dirty="0" smtClean="0"/>
+              <a:t>Conclusion</a:t>
+            </a:r>
+          </a:p>
+        </p:txBody>
+      </p:sp>
+      <p:sp>
+        <p:nvSpPr>
+          <p:cNvPr id="3" name="Content Placeholder 2"/>
+          <p:cNvSpPr>
+            <a:spLocks noGrp="1"/>
+          </p:cNvSpPr>
+          <p:nvPr>
+            <p:ph sz="half" idx="1"/>
           </p:nvPr>
         </p:nvSpPr>
         <p:spPr/>
@@ -6063,14 +5932,106 @@
           <a:bodyPr/>
           <a:lstStyle/>
           <a:p>
+            <a:endParaRPr lang="en-US" dirty="0" smtClean="0"/>
+          </a:p>
+          <a:p>
+            <a:r>
+              <a:rPr lang="en-US" dirty="0" smtClean="0"/>
+              <a:t>XXX</a:t>
+            </a:r>
+          </a:p>
+        </p:txBody>
+      </p:sp>
+      <p:sp>
+        <p:nvSpPr>
+          <p:cNvPr id="4" name="Content Placeholder 3"/>
+          <p:cNvSpPr>
+            <a:spLocks noGrp="1"/>
+          </p:cNvSpPr>
+          <p:nvPr>
+            <p:ph sz="half" idx="2"/>
+          </p:nvPr>
+        </p:nvSpPr>
+        <p:spPr/>
+        <p:txBody>
+          <a:bodyPr/>
+          <a:lstStyle/>
+          <a:p>
+            <a:endParaRPr lang="en-US" dirty="0" smtClean="0"/>
+          </a:p>
+          <a:p>
+            <a:r>
+              <a:rPr lang="en-US" dirty="0" smtClean="0"/>
+              <a:t>YYY</a:t>
+            </a:r>
             <a:endParaRPr lang="en-US" dirty="0"/>
+          </a:p>
+        </p:txBody>
+      </p:sp>
+      <p:sp>
+        <p:nvSpPr>
+          <p:cNvPr id="6" name="TextBox 5"/>
+          <p:cNvSpPr txBox="1"/>
+          <p:nvPr/>
+        </p:nvSpPr>
+        <p:spPr>
+          <a:xfrm>
+            <a:off x="2644811" y="1302405"/>
+            <a:ext cx="1568378" cy="523220"/>
+          </a:xfrm>
+          <a:prstGeom prst="rect">
+            <a:avLst/>
+          </a:prstGeom>
+          <a:noFill/>
+        </p:spPr>
+        <p:txBody>
+          <a:bodyPr wrap="none" rtlCol="0">
+            <a:spAutoFit/>
+          </a:bodyPr>
+          <a:lstStyle/>
+          <a:p>
+            <a:r>
+              <a:rPr lang="en-US" sz="2800" dirty="0" smtClean="0"/>
+              <a:t>Language</a:t>
+            </a:r>
+            <a:endParaRPr lang="en-US" sz="2800" dirty="0"/>
+          </a:p>
+        </p:txBody>
+      </p:sp>
+      <p:sp>
+        <p:nvSpPr>
+          <p:cNvPr id="10" name="TextBox 9"/>
+          <p:cNvSpPr txBox="1"/>
+          <p:nvPr/>
+        </p:nvSpPr>
+        <p:spPr>
+          <a:xfrm>
+            <a:off x="7978811" y="1295516"/>
+            <a:ext cx="1468415" cy="523220"/>
+          </a:xfrm>
+          <a:prstGeom prst="rect">
+            <a:avLst/>
+          </a:prstGeom>
+          <a:noFill/>
+        </p:spPr>
+        <p:txBody>
+          <a:bodyPr wrap="none" rtlCol="0">
+            <a:spAutoFit/>
+          </a:bodyPr>
+          <a:lstStyle/>
+          <a:p>
+            <a:r>
+              <a:rPr lang="en-US" sz="2800" dirty="0" smtClean="0"/>
+              <a:t>Statistics</a:t>
+            </a:r>
+            <a:endParaRPr lang="en-US" sz="2800" dirty="0"/>
           </a:p>
         </p:txBody>
       </p:sp>
     </p:spTree>
     <p:extLst>
       <p:ext uri="{BB962C8B-B14F-4D97-AF65-F5344CB8AC3E}">
-        <p14:creationId xmlns:p14="http://schemas.microsoft.com/office/powerpoint/2010/main" val="1572789813"/>
+        <p14:creationId xmlns:p14="http://schemas.microsoft.com/office/powerpoint/2010/main" val="2113882073"/>
       </p:ext>
     </p:extLst>
   </p:cSld>

</xml_diff>